<commit_message>
Small edits to DC_intro.pptx + pdf version
</commit_message>
<xml_diff>
--- a/assets/DC_intro.pptx
+++ b/assets/DC_intro.pptx
@@ -299,7 +299,7 @@
           <a:p>
             <a:fld id="{A2F0292D-1797-49A5-8D2D-8D50C72EF3CC}" type="datetimeFigureOut">
               <a:rPr lang="en-US" smtClean="0"/>
-              <a:t>5/31/16</a:t>
+              <a:t>8/22/16</a:t>
             </a:fld>
             <a:endParaRPr lang="en-US"/>
           </a:p>
@@ -469,7 +469,7 @@
           <a:p>
             <a:fld id="{A2F0292D-1797-49A5-8D2D-8D50C72EF3CC}" type="datetimeFigureOut">
               <a:rPr lang="en-US" smtClean="0"/>
-              <a:t>5/31/16</a:t>
+              <a:t>8/22/16</a:t>
             </a:fld>
             <a:endParaRPr lang="en-US"/>
           </a:p>
@@ -649,7 +649,7 @@
           <a:p>
             <a:fld id="{A2F0292D-1797-49A5-8D2D-8D50C72EF3CC}" type="datetimeFigureOut">
               <a:rPr lang="en-US" smtClean="0"/>
-              <a:t>5/31/16</a:t>
+              <a:t>8/22/16</a:t>
             </a:fld>
             <a:endParaRPr lang="en-US"/>
           </a:p>
@@ -819,7 +819,7 @@
           <a:p>
             <a:fld id="{A2F0292D-1797-49A5-8D2D-8D50C72EF3CC}" type="datetimeFigureOut">
               <a:rPr lang="en-US" smtClean="0"/>
-              <a:t>5/31/16</a:t>
+              <a:t>8/22/16</a:t>
             </a:fld>
             <a:endParaRPr lang="en-US"/>
           </a:p>
@@ -1069,7 +1069,7 @@
           <a:p>
             <a:fld id="{A2F0292D-1797-49A5-8D2D-8D50C72EF3CC}" type="datetimeFigureOut">
               <a:rPr lang="en-US" smtClean="0"/>
-              <a:t>5/31/16</a:t>
+              <a:t>8/22/16</a:t>
             </a:fld>
             <a:endParaRPr lang="en-US"/>
           </a:p>
@@ -1357,7 +1357,7 @@
           <a:p>
             <a:fld id="{A2F0292D-1797-49A5-8D2D-8D50C72EF3CC}" type="datetimeFigureOut">
               <a:rPr lang="en-US" smtClean="0"/>
-              <a:t>5/31/16</a:t>
+              <a:t>8/22/16</a:t>
             </a:fld>
             <a:endParaRPr lang="en-US"/>
           </a:p>
@@ -1779,7 +1779,7 @@
           <a:p>
             <a:fld id="{A2F0292D-1797-49A5-8D2D-8D50C72EF3CC}" type="datetimeFigureOut">
               <a:rPr lang="en-US" smtClean="0"/>
-              <a:t>5/31/16</a:t>
+              <a:t>8/22/16</a:t>
             </a:fld>
             <a:endParaRPr lang="en-US"/>
           </a:p>
@@ -1897,7 +1897,7 @@
           <a:p>
             <a:fld id="{A2F0292D-1797-49A5-8D2D-8D50C72EF3CC}" type="datetimeFigureOut">
               <a:rPr lang="en-US" smtClean="0"/>
-              <a:t>5/31/16</a:t>
+              <a:t>8/22/16</a:t>
             </a:fld>
             <a:endParaRPr lang="en-US"/>
           </a:p>
@@ -1992,7 +1992,7 @@
           <a:p>
             <a:fld id="{A2F0292D-1797-49A5-8D2D-8D50C72EF3CC}" type="datetimeFigureOut">
               <a:rPr lang="en-US" smtClean="0"/>
-              <a:t>5/31/16</a:t>
+              <a:t>8/22/16</a:t>
             </a:fld>
             <a:endParaRPr lang="en-US"/>
           </a:p>
@@ -2269,7 +2269,7 @@
           <a:p>
             <a:fld id="{A2F0292D-1797-49A5-8D2D-8D50C72EF3CC}" type="datetimeFigureOut">
               <a:rPr lang="en-US" smtClean="0"/>
-              <a:t>5/31/16</a:t>
+              <a:t>8/22/16</a:t>
             </a:fld>
             <a:endParaRPr lang="en-US"/>
           </a:p>
@@ -2522,7 +2522,7 @@
           <a:p>
             <a:fld id="{A2F0292D-1797-49A5-8D2D-8D50C72EF3CC}" type="datetimeFigureOut">
               <a:rPr lang="en-US" smtClean="0"/>
-              <a:t>5/31/16</a:t>
+              <a:t>8/22/16</a:t>
             </a:fld>
             <a:endParaRPr lang="en-US"/>
           </a:p>
@@ -2735,7 +2735,7 @@
           <a:p>
             <a:fld id="{A2F0292D-1797-49A5-8D2D-8D50C72EF3CC}" type="datetimeFigureOut">
               <a:rPr lang="en-US" smtClean="0"/>
-              <a:t>5/31/16</a:t>
+              <a:t>8/22/16</a:t>
             </a:fld>
             <a:endParaRPr lang="en-US"/>
           </a:p>
@@ -3297,20 +3297,28 @@
               <a:t>    </a:t>
             </a:r>
             <a:r>
-              <a:rPr lang="en-US" dirty="0" err="1" smtClean="0"/>
+              <a:rPr lang="en-US" dirty="0" err="1" smtClean="0">
+                <a:hlinkClick r:id="rId2"/>
+              </a:rPr>
               <a:t>uw</a:t>
             </a:r>
             <a:r>
-              <a:rPr lang="en-US" dirty="0" smtClean="0"/>
+              <a:rPr lang="en-US" dirty="0" smtClean="0">
+                <a:hlinkClick r:id="rId2"/>
+              </a:rPr>
               <a:t>-madison-</a:t>
             </a:r>
             <a:r>
-              <a:rPr lang="en-US" dirty="0" err="1" smtClean="0"/>
+              <a:rPr lang="en-US" dirty="0" err="1" smtClean="0">
+                <a:hlinkClick r:id="rId2"/>
+              </a:rPr>
               <a:t>aci.github.io</a:t>
             </a:r>
             <a:r>
-              <a:rPr lang="en-US" dirty="0" smtClean="0"/>
-              <a:t>/2016-06-01-uwmadison/</a:t>
+              <a:rPr lang="en-US" dirty="0" smtClean="0">
+                <a:hlinkClick r:id="rId2"/>
+              </a:rPr>
+              <a:t>/2016-08-23-uwmadison/</a:t>
             </a:r>
             <a:r>
               <a:rPr lang="en-US" dirty="0"/>
@@ -3338,15 +3346,21 @@
               <a:t>    </a:t>
             </a:r>
             <a:r>
-              <a:rPr lang="en-US" dirty="0" err="1" smtClean="0"/>
+              <a:rPr lang="en-US" dirty="0" err="1" smtClean="0">
+                <a:hlinkClick r:id="rId3"/>
+              </a:rPr>
               <a:t>kbroman.org</a:t>
             </a:r>
             <a:r>
-              <a:rPr lang="en-US" dirty="0" smtClean="0"/>
+              <a:rPr lang="en-US" dirty="0" smtClean="0">
+                <a:hlinkClick r:id="rId3"/>
+              </a:rPr>
               <a:t>/</a:t>
             </a:r>
             <a:r>
-              <a:rPr lang="en-US" dirty="0" err="1" smtClean="0"/>
+              <a:rPr lang="en-US" dirty="0" err="1" smtClean="0">
+                <a:hlinkClick r:id="rId3"/>
+              </a:rPr>
               <a:t>datacarp</a:t>
             </a:r>
             <a:r>
@@ -3379,12 +3393,16 @@
               <a:t>    </a:t>
             </a:r>
             <a:r>
-              <a:rPr lang="en-US" dirty="0" err="1" smtClean="0"/>
+              <a:rPr lang="en-US" dirty="0" err="1" smtClean="0">
+                <a:hlinkClick r:id="rId4"/>
+              </a:rPr>
               <a:t>pad.software-carpentry.org</a:t>
             </a:r>
             <a:r>
-              <a:rPr lang="en-US" dirty="0" smtClean="0"/>
-              <a:t>/2016-06-01-uwmadison</a:t>
+              <a:rPr lang="en-US" dirty="0" smtClean="0">
+                <a:hlinkClick r:id="rId4"/>
+              </a:rPr>
+              <a:t>/2016-08-23-uwmadison</a:t>
             </a:r>
             <a:r>
               <a:rPr lang="en-US" dirty="0"/>
@@ -3625,25 +3643,6 @@
           </a:p>
         </p:txBody>
       </p:sp>
-      <p:sp>
-        <p:nvSpPr>
-          <p:cNvPr id="5" name="Subtitle 4"/>
-          <p:cNvSpPr>
-            <a:spLocks noGrp="1"/>
-          </p:cNvSpPr>
-          <p:nvPr>
-            <p:ph type="subTitle" idx="1"/>
-          </p:nvPr>
-        </p:nvSpPr>
-        <p:spPr/>
-        <p:txBody>
-          <a:bodyPr/>
-          <a:lstStyle/>
-          <a:p>
-            <a:endParaRPr lang="en-US"/>
-          </a:p>
-        </p:txBody>
-      </p:sp>
     </p:spTree>
     <p:extLst>
       <p:ext uri="{BB962C8B-B14F-4D97-AF65-F5344CB8AC3E}">
@@ -3691,7 +3690,12 @@
             <p:ph type="title"/>
           </p:nvPr>
         </p:nvSpPr>
-        <p:spPr/>
+        <p:spPr>
+          <a:xfrm>
+            <a:off x="601351" y="1783948"/>
+            <a:ext cx="8106350" cy="3522545"/>
+          </a:xfrm>
+        </p:spPr>
         <p:txBody>
           <a:bodyPr>
             <a:normAutofit/>
@@ -3728,7 +3732,7 @@
             </a:br>
             <a:r>
               <a:rPr lang="en-US" dirty="0" smtClean="0"/>
-              <a:t>“You used the wrong data- the full dataset has more subjects.”</a:t>
+              <a:t>“You used the wrong data – the full data has more subjects.”</a:t>
             </a:r>
             <a:br>
               <a:rPr lang="en-US" dirty="0" smtClean="0"/>
@@ -3744,7 +3748,6 @@
               <a:rPr lang="en-US" dirty="0" smtClean="0"/>
               <a:t>“The color-coding in this spreadsheet was off.”  </a:t>
             </a:r>
-            <a:endParaRPr lang="en-US" dirty="0" smtClean="0"/>
           </a:p>
         </p:txBody>
       </p:sp>
@@ -3767,44 +3770,8 @@
           <a:p>
             <a:r>
               <a:rPr lang="en-US" dirty="0" smtClean="0"/>
-              <a:t>Data Problems*</a:t>
-            </a:r>
-          </a:p>
-        </p:txBody>
-      </p:sp>
-      <p:sp>
-        <p:nvSpPr>
-          <p:cNvPr id="6" name="TextBox 5"/>
-          <p:cNvSpPr txBox="1"/>
-          <p:nvPr/>
-        </p:nvSpPr>
-        <p:spPr>
-          <a:xfrm>
-            <a:off x="5452535" y="6129867"/>
-            <a:ext cx="3555999" cy="646331"/>
-          </a:xfrm>
-          <a:prstGeom prst="rect">
-            <a:avLst/>
-          </a:prstGeom>
-          <a:noFill/>
-        </p:spPr>
-        <p:txBody>
-          <a:bodyPr wrap="square" rtlCol="0">
-            <a:spAutoFit/>
-          </a:bodyPr>
-          <a:lstStyle/>
-          <a:p>
-            <a:r>
-              <a:rPr lang="en-US" dirty="0" smtClean="0"/>
-              <a:t>*modified from Karl Broman’s intro to </a:t>
-            </a:r>
-            <a:r>
-              <a:rPr lang="en-US" dirty="0" smtClean="0">
-                <a:hlinkClick r:id="rId2"/>
-              </a:rPr>
-              <a:t>Tools for Reproducible Research</a:t>
-            </a:r>
-            <a:endParaRPr lang="en-US" dirty="0"/>
+              <a:t>Data Problems</a:t>
+            </a:r>
           </a:p>
         </p:txBody>
       </p:sp>
@@ -3995,25 +3962,6 @@
           </a:p>
         </p:txBody>
       </p:sp>
-      <p:sp>
-        <p:nvSpPr>
-          <p:cNvPr id="5" name="Subtitle 4"/>
-          <p:cNvSpPr>
-            <a:spLocks noGrp="1"/>
-          </p:cNvSpPr>
-          <p:nvPr>
-            <p:ph type="subTitle" idx="1"/>
-          </p:nvPr>
-        </p:nvSpPr>
-        <p:spPr/>
-        <p:txBody>
-          <a:bodyPr/>
-          <a:lstStyle/>
-          <a:p>
-            <a:endParaRPr lang="en-US"/>
-          </a:p>
-        </p:txBody>
-      </p:sp>
     </p:spTree>
     <p:extLst>
       <p:ext uri="{BB962C8B-B14F-4D97-AF65-F5344CB8AC3E}">
@@ -4112,7 +4060,6 @@
               <a:rPr lang="en-US" dirty="0" smtClean="0"/>
               <a:t>Avoid doing things “by hand”</a:t>
             </a:r>
-            <a:endParaRPr lang="en-US" dirty="0" smtClean="0"/>
           </a:p>
         </p:txBody>
       </p:sp>
@@ -4189,43 +4136,50 @@
         </p:nvSpPr>
         <p:spPr/>
         <p:txBody>
-          <a:bodyPr/>
-          <a:lstStyle/>
-          <a:p>
-            <a:r>
-              <a:rPr lang="en-US" dirty="0" smtClean="0"/>
-              <a:t>We will cover: </a:t>
-            </a:r>
-            <a:br>
-              <a:rPr lang="en-US" dirty="0" smtClean="0"/>
-            </a:br>
-            <a:r>
-              <a:rPr lang="en-US" dirty="0" smtClean="0"/>
+          <a:bodyPr>
+            <a:normAutofit/>
+          </a:bodyPr>
+          <a:lstStyle/>
+          <a:p>
+            <a:r>
+              <a:rPr lang="en-US" dirty="0" smtClean="0"/>
+              <a:t>Today</a:t>
+            </a:r>
+            <a:br>
+              <a:rPr lang="en-US" dirty="0" smtClean="0"/>
+            </a:br>
+            <a:r>
+              <a:rPr lang="en-US" b="0" dirty="0" smtClean="0"/>
+              <a:t>     - organizing data in spreadsheets</a:t>
+            </a:r>
+            <a:r>
+              <a:rPr lang="en-US" b="0" dirty="0"/>
               <a:t/>
             </a:r>
             <a:br>
-              <a:rPr lang="en-US" dirty="0" smtClean="0"/>
-            </a:br>
-            <a:r>
-              <a:rPr lang="en-US" dirty="0" smtClean="0"/>
-              <a:t>     - spreadsheets</a:t>
-            </a:r>
-            <a:br>
-              <a:rPr lang="en-US" dirty="0" smtClean="0"/>
-            </a:br>
-            <a:r>
-              <a:rPr lang="en-US" dirty="0"/>
+              <a:rPr lang="en-US" b="0" dirty="0"/>
+            </a:br>
+            <a:r>
+              <a:rPr lang="en-US" b="0" dirty="0" smtClean="0"/>
+              <a:t>     - cleaning data with </a:t>
+            </a:r>
+            <a:r>
+              <a:rPr lang="en-US" b="0" dirty="0" err="1" smtClean="0"/>
+              <a:t>OpenRefine</a:t>
+            </a:r>
+            <a:r>
+              <a:rPr lang="en-US" b="0" dirty="0" smtClean="0"/>
               <a:t/>
             </a:r>
             <a:br>
-              <a:rPr lang="en-US" dirty="0"/>
-            </a:br>
-            <a:r>
-              <a:rPr lang="en-US" dirty="0" smtClean="0"/>
-              <a:t>     - Open Refine</a:t>
-            </a:r>
-            <a:br>
-              <a:rPr lang="en-US" dirty="0" smtClean="0"/>
+              <a:rPr lang="en-US" b="0" dirty="0" smtClean="0"/>
+            </a:br>
+            <a:r>
+              <a:rPr lang="en-US" b="0" dirty="0" smtClean="0"/>
+              <a:t>     - working with SQL databases</a:t>
+            </a:r>
+            <a:br>
+              <a:rPr lang="en-US" b="0" dirty="0" smtClean="0"/>
             </a:br>
             <a:r>
               <a:rPr lang="en-US" dirty="0" smtClean="0"/>
@@ -4236,11 +4190,8 @@
             </a:br>
             <a:r>
               <a:rPr lang="en-US" dirty="0" smtClean="0"/>
-              <a:t>     - SQL</a:t>
-            </a:r>
-            <a:br>
-              <a:rPr lang="en-US" dirty="0" smtClean="0"/>
-            </a:br>
+              <a:t>Tomorrow</a:t>
+            </a:r>
             <a:r>
               <a:rPr lang="en-US" dirty="0" smtClean="0"/>
               <a:t/>
@@ -4249,10 +4200,48 @@
               <a:rPr lang="en-US" dirty="0" smtClean="0"/>
             </a:br>
             <a:r>
-              <a:rPr lang="en-US" dirty="0" smtClean="0"/>
-              <a:t>     - R and assorted packages</a:t>
-            </a:r>
-            <a:endParaRPr lang="en-US" dirty="0"/>
+              <a:rPr lang="en-US" b="0" dirty="0" smtClean="0"/>
+              <a:t>     </a:t>
+            </a:r>
+            <a:r>
+              <a:rPr lang="en-US" b="0" dirty="0"/>
+              <a:t>- data manipulation in </a:t>
+            </a:r>
+            <a:r>
+              <a:rPr lang="en-US" b="0" dirty="0" smtClean="0"/>
+              <a:t>R</a:t>
+            </a:r>
+            <a:r>
+              <a:rPr lang="en-US" b="0" dirty="0"/>
+              <a:t/>
+            </a:r>
+            <a:br>
+              <a:rPr lang="en-US" b="0" dirty="0"/>
+            </a:br>
+            <a:r>
+              <a:rPr lang="en-US" b="0" dirty="0"/>
+              <a:t>     </a:t>
+            </a:r>
+            <a:r>
+              <a:rPr lang="en-US" b="0" dirty="0" smtClean="0"/>
+              <a:t>- data visualization in R</a:t>
+            </a:r>
+            <a:r>
+              <a:rPr lang="en-US" b="0" dirty="0"/>
+              <a:t/>
+            </a:r>
+            <a:br>
+              <a:rPr lang="en-US" b="0" dirty="0"/>
+            </a:br>
+            <a:r>
+              <a:rPr lang="en-US" b="0" dirty="0"/>
+              <a:t>     </a:t>
+            </a:r>
+            <a:r>
+              <a:rPr lang="en-US" b="0" dirty="0" smtClean="0"/>
+              <a:t>- reproducible reports</a:t>
+            </a:r>
+            <a:endParaRPr lang="en-US" b="0" dirty="0"/>
           </a:p>
         </p:txBody>
       </p:sp>
@@ -4333,7 +4322,22 @@
           <a:p>
             <a:r>
               <a:rPr lang="en-US" dirty="0" smtClean="0"/>
-              <a:t>Hands-on, working with real data.  </a:t>
+              <a:t>Hands-on, working with real data</a:t>
+            </a:r>
+            <a:r>
+              <a:rPr lang="en-US" dirty="0" smtClean="0"/>
+              <a:t>.</a:t>
+            </a:r>
+            <a:br>
+              <a:rPr lang="en-US" dirty="0" smtClean="0"/>
+            </a:br>
+            <a:r>
+              <a:rPr lang="en-US" dirty="0" smtClean="0"/>
+              <a:t>  </a:t>
+            </a:r>
+            <a:r>
+              <a:rPr lang="en-US" dirty="0" smtClean="0"/>
+              <a:t/>
             </a:r>
             <a:br>
               <a:rPr lang="en-US" dirty="0" smtClean="0"/>
@@ -4465,25 +4469,6 @@
           </a:p>
         </p:txBody>
       </p:sp>
-      <p:sp>
-        <p:nvSpPr>
-          <p:cNvPr id="5" name="Subtitle 4"/>
-          <p:cNvSpPr>
-            <a:spLocks noGrp="1"/>
-          </p:cNvSpPr>
-          <p:nvPr>
-            <p:ph type="subTitle" idx="1"/>
-          </p:nvPr>
-        </p:nvSpPr>
-        <p:spPr/>
-        <p:txBody>
-          <a:bodyPr/>
-          <a:lstStyle/>
-          <a:p>
-            <a:endParaRPr lang="en-US"/>
-          </a:p>
-        </p:txBody>
-      </p:sp>
     </p:spTree>
     <p:extLst>
       <p:ext uri="{BB962C8B-B14F-4D97-AF65-F5344CB8AC3E}">
@@ -4550,64 +4535,72 @@
             </a:br>
             <a:r>
               <a:rPr lang="en-US" dirty="0" smtClean="0"/>
-              <a:t>http://</a:t>
-            </a:r>
-            <a:r>
-              <a:rPr lang="en-US" dirty="0" err="1" smtClean="0"/>
+              <a:t>	</a:t>
+            </a:r>
+            <a:r>
+              <a:rPr lang="en-US" dirty="0" err="1" smtClean="0">
+                <a:hlinkClick r:id="rId2"/>
+              </a:rPr>
               <a:t>www.datacarpentry.org</a:t>
-            </a:r>
-            <a:r>
-              <a:rPr lang="en-US" dirty="0" smtClean="0"/>
-              <a:t>/code-of-conduct/</a:t>
-            </a:r>
-            <a:br>
-              <a:rPr lang="en-US" dirty="0" smtClean="0"/>
-            </a:br>
-            <a:r>
-              <a:rPr lang="en-US" dirty="0"/>
-              <a:t/>
-            </a:r>
-            <a:br>
-              <a:rPr lang="en-US" dirty="0"/>
-            </a:br>
-            <a:r>
-              <a:rPr lang="en-US" dirty="0" smtClean="0"/>
-              <a:t>Be professional.  </a:t>
-            </a:r>
-            <a:br>
-              <a:rPr lang="en-US" dirty="0" smtClean="0"/>
-            </a:br>
-            <a:r>
-              <a:rPr lang="en-US" dirty="0" smtClean="0"/>
-              <a:t>Be kind.  </a:t>
-            </a:r>
-            <a:br>
-              <a:rPr lang="en-US" dirty="0" smtClean="0"/>
-            </a:br>
-            <a:r>
-              <a:rPr lang="en-US" dirty="0"/>
-              <a:t/>
-            </a:r>
-            <a:br>
-              <a:rPr lang="en-US" dirty="0"/>
-            </a:br>
-            <a:r>
-              <a:rPr lang="en-US" dirty="0" smtClean="0"/>
-              <a:t>If you have any concerns, email Christina at </a:t>
             </a:r>
             <a:r>
               <a:rPr lang="en-US" dirty="0" smtClean="0">
                 <a:hlinkClick r:id="rId2"/>
               </a:rPr>
-              <a:t>ckoch5@wisc.edu</a:t>
-            </a:r>
-            <a:r>
-              <a:rPr lang="en-US" dirty="0" smtClean="0"/>
-              <a:t> or Lauren at </a:t>
+              <a:t>/code-of-conduct/</a:t>
+            </a:r>
+            <a:r>
+              <a:rPr lang="en-US" dirty="0" smtClean="0"/>
+              <a:t/>
+            </a:r>
+            <a:br>
+              <a:rPr lang="en-US" dirty="0" smtClean="0"/>
+            </a:br>
+            <a:r>
+              <a:rPr lang="en-US" dirty="0"/>
+              <a:t/>
+            </a:r>
+            <a:br>
+              <a:rPr lang="en-US" dirty="0"/>
+            </a:br>
+            <a:r>
+              <a:rPr lang="en-US" dirty="0" smtClean="0"/>
+              <a:t>Be professional.  </a:t>
+            </a:r>
+            <a:br>
+              <a:rPr lang="en-US" dirty="0" smtClean="0"/>
+            </a:br>
+            <a:r>
+              <a:rPr lang="en-US" dirty="0" smtClean="0"/>
+              <a:t>Be kind.  </a:t>
+            </a:r>
+            <a:br>
+              <a:rPr lang="en-US" dirty="0" smtClean="0"/>
+            </a:br>
+            <a:r>
+              <a:rPr lang="en-US" dirty="0"/>
+              <a:t/>
+            </a:r>
+            <a:br>
+              <a:rPr lang="en-US" dirty="0"/>
+            </a:br>
+            <a:r>
+              <a:rPr lang="en-US" dirty="0" smtClean="0"/>
+              <a:t>If you have any concerns, email Christina at </a:t>
             </a:r>
             <a:r>
               <a:rPr lang="en-US" dirty="0" smtClean="0">
                 <a:hlinkClick r:id="rId3"/>
+              </a:rPr>
+              <a:t>ckoch5@wisc.edu</a:t>
+            </a:r>
+            <a:r>
+              <a:rPr lang="en-US" dirty="0" smtClean="0"/>
+              <a:t> or Lauren at </a:t>
+            </a:r>
+            <a:r>
+              <a:rPr lang="en-US" dirty="0" smtClean="0">
+                <a:hlinkClick r:id="rId4"/>
               </a:rPr>
               <a:t>lmichael@wisc.edu</a:t>
             </a:r>

</xml_diff>